<commit_message>
Updated analysis flow chart and Interrogate instructions
</commit_message>
<xml_diff>
--- a/analysisFlowchart.pptx
+++ b/analysisFlowchart.pptx
@@ -5,8 +5,7 @@
     <p:sldMasterId id="2147483648" r:id="rId1"/>
   </p:sldMasterIdLst>
   <p:sldIdLst>
-    <p:sldId id="256" r:id="rId2"/>
-    <p:sldId id="257" r:id="rId3"/>
+    <p:sldId id="257" r:id="rId2"/>
   </p:sldIdLst>
   <p:sldSz cx="9144000" cy="6858000" type="screen4x3"/>
   <p:notesSz cx="6858000" cy="9144000"/>
@@ -289,7 +288,7 @@
           <a:p>
             <a:fld id="{2D20672B-9F9B-AE46-BA49-4865BCCE4148}" type="datetimeFigureOut">
               <a:rPr lang="en-US" smtClean="0"/>
-              <a:t>2/24/19</a:t>
+              <a:t>3/20/19</a:t>
             </a:fld>
             <a:endParaRPr lang="en-US"/>
           </a:p>
@@ -459,7 +458,7 @@
           <a:p>
             <a:fld id="{2D20672B-9F9B-AE46-BA49-4865BCCE4148}" type="datetimeFigureOut">
               <a:rPr lang="en-US" smtClean="0"/>
-              <a:t>2/24/19</a:t>
+              <a:t>3/20/19</a:t>
             </a:fld>
             <a:endParaRPr lang="en-US"/>
           </a:p>
@@ -639,7 +638,7 @@
           <a:p>
             <a:fld id="{2D20672B-9F9B-AE46-BA49-4865BCCE4148}" type="datetimeFigureOut">
               <a:rPr lang="en-US" smtClean="0"/>
-              <a:t>2/24/19</a:t>
+              <a:t>3/20/19</a:t>
             </a:fld>
             <a:endParaRPr lang="en-US"/>
           </a:p>
@@ -809,7 +808,7 @@
           <a:p>
             <a:fld id="{2D20672B-9F9B-AE46-BA49-4865BCCE4148}" type="datetimeFigureOut">
               <a:rPr lang="en-US" smtClean="0"/>
-              <a:t>2/24/19</a:t>
+              <a:t>3/20/19</a:t>
             </a:fld>
             <a:endParaRPr lang="en-US"/>
           </a:p>
@@ -1055,7 +1054,7 @@
           <a:p>
             <a:fld id="{2D20672B-9F9B-AE46-BA49-4865BCCE4148}" type="datetimeFigureOut">
               <a:rPr lang="en-US" smtClean="0"/>
-              <a:t>2/24/19</a:t>
+              <a:t>3/20/19</a:t>
             </a:fld>
             <a:endParaRPr lang="en-US"/>
           </a:p>
@@ -1343,7 +1342,7 @@
           <a:p>
             <a:fld id="{2D20672B-9F9B-AE46-BA49-4865BCCE4148}" type="datetimeFigureOut">
               <a:rPr lang="en-US" smtClean="0"/>
-              <a:t>2/24/19</a:t>
+              <a:t>3/20/19</a:t>
             </a:fld>
             <a:endParaRPr lang="en-US"/>
           </a:p>
@@ -1765,7 +1764,7 @@
           <a:p>
             <a:fld id="{2D20672B-9F9B-AE46-BA49-4865BCCE4148}" type="datetimeFigureOut">
               <a:rPr lang="en-US" smtClean="0"/>
-              <a:t>2/24/19</a:t>
+              <a:t>3/20/19</a:t>
             </a:fld>
             <a:endParaRPr lang="en-US"/>
           </a:p>
@@ -1883,7 +1882,7 @@
           <a:p>
             <a:fld id="{2D20672B-9F9B-AE46-BA49-4865BCCE4148}" type="datetimeFigureOut">
               <a:rPr lang="en-US" smtClean="0"/>
-              <a:t>2/24/19</a:t>
+              <a:t>3/20/19</a:t>
             </a:fld>
             <a:endParaRPr lang="en-US"/>
           </a:p>
@@ -1978,7 +1977,7 @@
           <a:p>
             <a:fld id="{2D20672B-9F9B-AE46-BA49-4865BCCE4148}" type="datetimeFigureOut">
               <a:rPr lang="en-US" smtClean="0"/>
-              <a:t>2/24/19</a:t>
+              <a:t>3/20/19</a:t>
             </a:fld>
             <a:endParaRPr lang="en-US"/>
           </a:p>
@@ -2255,7 +2254,7 @@
           <a:p>
             <a:fld id="{2D20672B-9F9B-AE46-BA49-4865BCCE4148}" type="datetimeFigureOut">
               <a:rPr lang="en-US" smtClean="0"/>
-              <a:t>2/24/19</a:t>
+              <a:t>3/20/19</a:t>
             </a:fld>
             <a:endParaRPr lang="en-US"/>
           </a:p>
@@ -2508,7 +2507,7 @@
           <a:p>
             <a:fld id="{2D20672B-9F9B-AE46-BA49-4865BCCE4148}" type="datetimeFigureOut">
               <a:rPr lang="en-US" smtClean="0"/>
-              <a:t>2/24/19</a:t>
+              <a:t>3/20/19</a:t>
             </a:fld>
             <a:endParaRPr lang="en-US"/>
           </a:p>
@@ -2721,7 +2720,7 @@
           <a:p>
             <a:fld id="{2D20672B-9F9B-AE46-BA49-4865BCCE4148}" type="datetimeFigureOut">
               <a:rPr lang="en-US" smtClean="0"/>
-              <a:t>2/24/19</a:t>
+              <a:t>3/20/19</a:t>
             </a:fld>
             <a:endParaRPr lang="en-US"/>
           </a:p>
@@ -3103,74 +3102,6 @@
             <a:spLocks noGrp="1"/>
           </p:cNvSpPr>
           <p:nvPr>
-            <p:ph type="ctrTitle"/>
-          </p:nvPr>
-        </p:nvSpPr>
-        <p:spPr/>
-        <p:txBody>
-          <a:bodyPr/>
-          <a:lstStyle/>
-          <a:p>
-            <a:endParaRPr lang="en-US"/>
-          </a:p>
-        </p:txBody>
-      </p:sp>
-      <p:sp>
-        <p:nvSpPr>
-          <p:cNvPr id="3" name="Subtitle 2"/>
-          <p:cNvSpPr>
-            <a:spLocks noGrp="1"/>
-          </p:cNvSpPr>
-          <p:nvPr>
-            <p:ph type="subTitle" idx="1"/>
-          </p:nvPr>
-        </p:nvSpPr>
-        <p:spPr/>
-        <p:txBody>
-          <a:bodyPr/>
-          <a:lstStyle/>
-          <a:p>
-            <a:endParaRPr lang="en-US"/>
-          </a:p>
-        </p:txBody>
-      </p:sp>
-    </p:spTree>
-    <p:extLst>
-      <p:ext uri="{BB962C8B-B14F-4D97-AF65-F5344CB8AC3E}">
-        <p14:creationId xmlns:p14="http://schemas.microsoft.com/office/powerpoint/2010/main" val="135260397"/>
-      </p:ext>
-    </p:extLst>
-  </p:cSld>
-  <p:clrMapOvr>
-    <a:masterClrMapping/>
-  </p:clrMapOvr>
-</p:sld>
-</file>
-
-<file path=ppt/slides/slide2.xml><?xml version="1.0" encoding="utf-8"?>
-<p:sld xmlns:a="http://schemas.openxmlformats.org/drawingml/2006/main" xmlns:r="http://schemas.openxmlformats.org/officeDocument/2006/relationships" xmlns:p="http://schemas.openxmlformats.org/presentationml/2006/main">
-  <p:cSld>
-    <p:spTree>
-      <p:nvGrpSpPr>
-        <p:cNvPr id="1" name=""/>
-        <p:cNvGrpSpPr/>
-        <p:nvPr/>
-      </p:nvGrpSpPr>
-      <p:grpSpPr>
-        <a:xfrm>
-          <a:off x="0" y="0"/>
-          <a:ext cx="0" cy="0"/>
-          <a:chOff x="0" y="0"/>
-          <a:chExt cx="0" cy="0"/>
-        </a:xfrm>
-      </p:grpSpPr>
-      <p:sp>
-        <p:nvSpPr>
-          <p:cNvPr id="2" name="Title 1"/>
-          <p:cNvSpPr>
-            <a:spLocks noGrp="1"/>
-          </p:cNvSpPr>
-          <p:nvPr>
             <p:ph type="title"/>
           </p:nvPr>
         </p:nvSpPr>
@@ -3202,7 +3133,7 @@
         </p:nvSpPr>
         <p:spPr>
           <a:xfrm>
-            <a:off x="821765" y="1135529"/>
+            <a:off x="442403" y="1086044"/>
             <a:ext cx="1160519" cy="369332"/>
           </a:xfrm>
           <a:prstGeom prst="rect">
@@ -3232,7 +3163,7 @@
         </p:nvSpPr>
         <p:spPr>
           <a:xfrm>
-            <a:off x="3615765" y="1210235"/>
+            <a:off x="3236403" y="1086044"/>
             <a:ext cx="1745941" cy="369332"/>
           </a:xfrm>
           <a:prstGeom prst="rect">
@@ -3262,7 +3193,7 @@
         </p:nvSpPr>
         <p:spPr>
           <a:xfrm>
-            <a:off x="821765" y="2928470"/>
+            <a:off x="442403" y="2878985"/>
             <a:ext cx="1250350" cy="369332"/>
           </a:xfrm>
           <a:prstGeom prst="rect">
@@ -3292,8 +3223,8 @@
         </p:nvSpPr>
         <p:spPr>
           <a:xfrm>
-            <a:off x="6984539" y="1135529"/>
-            <a:ext cx="620520" cy="369332"/>
+            <a:off x="6605177" y="1086044"/>
+            <a:ext cx="664590" cy="369332"/>
           </a:xfrm>
           <a:prstGeom prst="rect">
             <a:avLst/>
@@ -3307,8 +3238,12 @@
           <a:lstStyle/>
           <a:p>
             <a:r>
+              <a:rPr lang="en-US" dirty="0"/>
+              <a:t>L</a:t>
+            </a:r>
+            <a:r>
               <a:rPr lang="en-US" dirty="0" smtClean="0"/>
-              <a:t>local</a:t>
+              <a:t>ocal</a:t>
             </a:r>
             <a:endParaRPr lang="en-US" dirty="0"/>
           </a:p>
@@ -3322,7 +3257,7 @@
         </p:nvSpPr>
         <p:spPr>
           <a:xfrm>
-            <a:off x="926353" y="1709840"/>
+            <a:off x="546991" y="1660355"/>
             <a:ext cx="948284" cy="369332"/>
           </a:xfrm>
           <a:prstGeom prst="rect">
@@ -3352,7 +3287,7 @@
         </p:nvSpPr>
         <p:spPr>
           <a:xfrm>
-            <a:off x="657412" y="1509058"/>
+            <a:off x="278050" y="1459573"/>
             <a:ext cx="2271059" cy="1284941"/>
           </a:xfrm>
           <a:prstGeom prst="rect">
@@ -3401,8 +3336,8 @@
         </p:nvSpPr>
         <p:spPr>
           <a:xfrm>
-            <a:off x="657412" y="3297802"/>
-            <a:ext cx="2271059" cy="2813139"/>
+            <a:off x="278050" y="3296676"/>
+            <a:ext cx="2271059" cy="2583335"/>
           </a:xfrm>
           <a:prstGeom prst="rect">
             <a:avLst/>
@@ -3450,7 +3385,7 @@
         </p:nvSpPr>
         <p:spPr>
           <a:xfrm>
-            <a:off x="3155576" y="1521900"/>
+            <a:off x="2776214" y="1472415"/>
             <a:ext cx="2910542" cy="4589041"/>
           </a:xfrm>
           <a:prstGeom prst="rect">
@@ -3499,7 +3434,7 @@
         </p:nvSpPr>
         <p:spPr>
           <a:xfrm>
-            <a:off x="6233458" y="1509058"/>
+            <a:off x="5854096" y="1459573"/>
             <a:ext cx="2910542" cy="4589041"/>
           </a:xfrm>
           <a:prstGeom prst="rect">
@@ -3548,7 +3483,7 @@
         </p:nvSpPr>
         <p:spPr>
           <a:xfrm>
-            <a:off x="821765" y="1882589"/>
+            <a:off x="442403" y="1833104"/>
             <a:ext cx="2589532" cy="1045881"/>
           </a:xfrm>
           <a:prstGeom prst="rightArrow">
@@ -3576,7 +3511,14 @@
             <a:pPr algn="ctr"/>
             <a:r>
               <a:rPr lang="en-US" sz="1400" dirty="0" smtClean="0"/>
-              <a:t>0_FastqBasespace2ComputeCanada.doc</a:t>
+              <a:t>0_FastqBasespace2</a:t>
+            </a:r>
+          </a:p>
+          <a:p>
+            <a:pPr algn="ctr"/>
+            <a:r>
+              <a:rPr lang="en-US" sz="1400" dirty="0" err="1" smtClean="0"/>
+              <a:t>ComputeCanada.doc</a:t>
             </a:r>
             <a:endParaRPr lang="en-US" sz="1400" dirty="0"/>
           </a:p>
@@ -3590,7 +3532,7 @@
         </p:nvSpPr>
         <p:spPr>
           <a:xfrm>
-            <a:off x="3272118" y="1862240"/>
+            <a:off x="2892756" y="1812755"/>
             <a:ext cx="778591" cy="307777"/>
           </a:xfrm>
           <a:prstGeom prst="rect">
@@ -3620,7 +3562,7 @@
         </p:nvSpPr>
         <p:spPr>
           <a:xfrm>
-            <a:off x="3456774" y="2308405"/>
+            <a:off x="3077412" y="2258920"/>
             <a:ext cx="2577286" cy="307777"/>
           </a:xfrm>
           <a:prstGeom prst="rect">
@@ -3650,7 +3592,7 @@
         </p:nvSpPr>
         <p:spPr>
           <a:xfrm>
-            <a:off x="3456774" y="2536261"/>
+            <a:off x="3077412" y="2486776"/>
             <a:ext cx="1064289" cy="307777"/>
           </a:xfrm>
           <a:prstGeom prst="rect">
@@ -3680,7 +3622,7 @@
         </p:nvSpPr>
         <p:spPr>
           <a:xfrm>
-            <a:off x="3456774" y="2764117"/>
+            <a:off x="3077412" y="2714632"/>
             <a:ext cx="1379091" cy="307777"/>
           </a:xfrm>
           <a:prstGeom prst="rect">
@@ -3710,7 +3652,7 @@
         </p:nvSpPr>
         <p:spPr>
           <a:xfrm>
-            <a:off x="3456774" y="2991973"/>
+            <a:off x="3077412" y="2942488"/>
             <a:ext cx="2230661" cy="307777"/>
           </a:xfrm>
           <a:prstGeom prst="rect">
@@ -3740,7 +3682,7 @@
         </p:nvSpPr>
         <p:spPr>
           <a:xfrm>
-            <a:off x="3456774" y="3219829"/>
+            <a:off x="3077412" y="3170344"/>
             <a:ext cx="1164840" cy="307777"/>
           </a:xfrm>
           <a:prstGeom prst="rect">
@@ -3770,7 +3712,7 @@
         </p:nvSpPr>
         <p:spPr>
           <a:xfrm>
-            <a:off x="881530" y="4265672"/>
+            <a:off x="502168" y="4826502"/>
             <a:ext cx="2589532" cy="1045881"/>
           </a:xfrm>
           <a:prstGeom prst="rightArrow">
@@ -3798,7 +3740,14 @@
             <a:pPr algn="ctr"/>
             <a:r>
               <a:rPr lang="en-US" sz="1400" dirty="0" smtClean="0"/>
-              <a:t>6b_ClntabFromInterrogate2ComputeCanada</a:t>
+              <a:t>6c_ClntabFromInterrogate2</a:t>
+            </a:r>
+          </a:p>
+          <a:p>
+            <a:pPr algn="ctr"/>
+            <a:r>
+              <a:rPr lang="en-US" sz="1400" dirty="0" err="1" smtClean="0"/>
+              <a:t>ComputeCanada</a:t>
             </a:r>
             <a:endParaRPr lang="en-US" sz="1400" dirty="0"/>
           </a:p>
@@ -3812,7 +3761,7 @@
         </p:nvSpPr>
         <p:spPr>
           <a:xfrm flipH="1">
-            <a:off x="832000" y="3331888"/>
+            <a:off x="452638" y="3480343"/>
             <a:ext cx="2589532" cy="1045881"/>
           </a:xfrm>
           <a:prstGeom prst="rightArrow">
@@ -3840,9 +3789,72 @@
             <a:pPr algn="ctr"/>
             <a:r>
               <a:rPr lang="en-US" sz="1400" dirty="0" smtClean="0"/>
-              <a:t>6a_TrimmedFromComputeCanada2Interrogate</a:t>
+              <a:t>6a_TrimmedFromCompute</a:t>
+            </a:r>
+          </a:p>
+          <a:p>
+            <a:pPr algn="ctr"/>
+            <a:r>
+              <a:rPr lang="en-US" sz="1400" dirty="0" smtClean="0"/>
+              <a:t>Canada2Interrogate</a:t>
             </a:r>
             <a:endParaRPr lang="en-US" sz="1400" dirty="0"/>
+          </a:p>
+        </p:txBody>
+      </p:sp>
+      <p:sp>
+        <p:nvSpPr>
+          <p:cNvPr id="21" name="TextBox 20"/>
+          <p:cNvSpPr txBox="1"/>
+          <p:nvPr/>
+        </p:nvSpPr>
+        <p:spPr>
+          <a:xfrm>
+            <a:off x="296908" y="4552762"/>
+            <a:ext cx="2264587" cy="307777"/>
+          </a:xfrm>
+          <a:prstGeom prst="rect">
+            <a:avLst/>
+          </a:prstGeom>
+          <a:noFill/>
+        </p:spPr>
+        <p:txBody>
+          <a:bodyPr wrap="none" rtlCol="0">
+            <a:spAutoFit/>
+          </a:bodyPr>
+          <a:lstStyle/>
+          <a:p>
+            <a:r>
+              <a:rPr lang="en-US" sz="1400" dirty="0" smtClean="0"/>
+              <a:t>6b_InterrogateAnalysis.docx</a:t>
+            </a:r>
+            <a:endParaRPr lang="en-US" sz="1400" dirty="0"/>
+          </a:p>
+        </p:txBody>
+      </p:sp>
+      <p:sp>
+        <p:nvSpPr>
+          <p:cNvPr id="22" name="TextBox 21"/>
+          <p:cNvSpPr txBox="1"/>
+          <p:nvPr/>
+        </p:nvSpPr>
+        <p:spPr>
+          <a:xfrm>
+            <a:off x="10737757" y="5262061"/>
+            <a:ext cx="184666" cy="369332"/>
+          </a:xfrm>
+          <a:prstGeom prst="rect">
+            <a:avLst/>
+          </a:prstGeom>
+          <a:noFill/>
+        </p:spPr>
+        <p:txBody>
+          <a:bodyPr wrap="none" rtlCol="0">
+            <a:spAutoFit/>
+          </a:bodyPr>
+          <a:lstStyle/>
+          <a:p>
+            <a:endParaRPr lang="en-US"/>
           </a:p>
         </p:txBody>
       </p:sp>

</xml_diff>

<commit_message>
Updated flowchart and added alert msgbox to 'filter.R'
</commit_message>
<xml_diff>
--- a/analysisFlowchart.pptx
+++ b/analysisFlowchart.pptx
@@ -6,6 +6,7 @@
   </p:sldMasterIdLst>
   <p:sldIdLst>
     <p:sldId id="257" r:id="rId2"/>
+    <p:sldId id="258" r:id="rId3"/>
   </p:sldIdLst>
   <p:sldSz cx="9144000" cy="6858000" type="screen4x3"/>
   <p:notesSz cx="6858000" cy="9144000"/>
@@ -288,7 +289,7 @@
           <a:p>
             <a:fld id="{2D20672B-9F9B-AE46-BA49-4865BCCE4148}" type="datetimeFigureOut">
               <a:rPr lang="en-US" smtClean="0"/>
-              <a:t>3/20/19</a:t>
+              <a:t>8/2/19</a:t>
             </a:fld>
             <a:endParaRPr lang="en-US"/>
           </a:p>
@@ -458,7 +459,7 @@
           <a:p>
             <a:fld id="{2D20672B-9F9B-AE46-BA49-4865BCCE4148}" type="datetimeFigureOut">
               <a:rPr lang="en-US" smtClean="0"/>
-              <a:t>3/20/19</a:t>
+              <a:t>8/2/19</a:t>
             </a:fld>
             <a:endParaRPr lang="en-US"/>
           </a:p>
@@ -638,7 +639,7 @@
           <a:p>
             <a:fld id="{2D20672B-9F9B-AE46-BA49-4865BCCE4148}" type="datetimeFigureOut">
               <a:rPr lang="en-US" smtClean="0"/>
-              <a:t>3/20/19</a:t>
+              <a:t>8/2/19</a:t>
             </a:fld>
             <a:endParaRPr lang="en-US"/>
           </a:p>
@@ -808,7 +809,7 @@
           <a:p>
             <a:fld id="{2D20672B-9F9B-AE46-BA49-4865BCCE4148}" type="datetimeFigureOut">
               <a:rPr lang="en-US" smtClean="0"/>
-              <a:t>3/20/19</a:t>
+              <a:t>8/2/19</a:t>
             </a:fld>
             <a:endParaRPr lang="en-US"/>
           </a:p>
@@ -1054,7 +1055,7 @@
           <a:p>
             <a:fld id="{2D20672B-9F9B-AE46-BA49-4865BCCE4148}" type="datetimeFigureOut">
               <a:rPr lang="en-US" smtClean="0"/>
-              <a:t>3/20/19</a:t>
+              <a:t>8/2/19</a:t>
             </a:fld>
             <a:endParaRPr lang="en-US"/>
           </a:p>
@@ -1342,7 +1343,7 @@
           <a:p>
             <a:fld id="{2D20672B-9F9B-AE46-BA49-4865BCCE4148}" type="datetimeFigureOut">
               <a:rPr lang="en-US" smtClean="0"/>
-              <a:t>3/20/19</a:t>
+              <a:t>8/2/19</a:t>
             </a:fld>
             <a:endParaRPr lang="en-US"/>
           </a:p>
@@ -1764,7 +1765,7 @@
           <a:p>
             <a:fld id="{2D20672B-9F9B-AE46-BA49-4865BCCE4148}" type="datetimeFigureOut">
               <a:rPr lang="en-US" smtClean="0"/>
-              <a:t>3/20/19</a:t>
+              <a:t>8/2/19</a:t>
             </a:fld>
             <a:endParaRPr lang="en-US"/>
           </a:p>
@@ -1882,7 +1883,7 @@
           <a:p>
             <a:fld id="{2D20672B-9F9B-AE46-BA49-4865BCCE4148}" type="datetimeFigureOut">
               <a:rPr lang="en-US" smtClean="0"/>
-              <a:t>3/20/19</a:t>
+              <a:t>8/2/19</a:t>
             </a:fld>
             <a:endParaRPr lang="en-US"/>
           </a:p>
@@ -1977,7 +1978,7 @@
           <a:p>
             <a:fld id="{2D20672B-9F9B-AE46-BA49-4865BCCE4148}" type="datetimeFigureOut">
               <a:rPr lang="en-US" smtClean="0"/>
-              <a:t>3/20/19</a:t>
+              <a:t>8/2/19</a:t>
             </a:fld>
             <a:endParaRPr lang="en-US"/>
           </a:p>
@@ -2254,7 +2255,7 @@
           <a:p>
             <a:fld id="{2D20672B-9F9B-AE46-BA49-4865BCCE4148}" type="datetimeFigureOut">
               <a:rPr lang="en-US" smtClean="0"/>
-              <a:t>3/20/19</a:t>
+              <a:t>8/2/19</a:t>
             </a:fld>
             <a:endParaRPr lang="en-US"/>
           </a:p>
@@ -2507,7 +2508,7 @@
           <a:p>
             <a:fld id="{2D20672B-9F9B-AE46-BA49-4865BCCE4148}" type="datetimeFigureOut">
               <a:rPr lang="en-US" smtClean="0"/>
-              <a:t>3/20/19</a:t>
+              <a:t>8/2/19</a:t>
             </a:fld>
             <a:endParaRPr lang="en-US"/>
           </a:p>
@@ -2720,7 +2721,7 @@
           <a:p>
             <a:fld id="{2D20672B-9F9B-AE46-BA49-4865BCCE4148}" type="datetimeFigureOut">
               <a:rPr lang="en-US" smtClean="0"/>
-              <a:t>3/20/19</a:t>
+              <a:t>8/2/19</a:t>
             </a:fld>
             <a:endParaRPr lang="en-US"/>
           </a:p>
@@ -3133,7 +3134,7 @@
         </p:nvSpPr>
         <p:spPr>
           <a:xfrm>
-            <a:off x="442403" y="1086044"/>
+            <a:off x="442403" y="860994"/>
             <a:ext cx="1160519" cy="369332"/>
           </a:xfrm>
           <a:prstGeom prst="rect">
@@ -3163,7 +3164,7 @@
         </p:nvSpPr>
         <p:spPr>
           <a:xfrm>
-            <a:off x="3236403" y="1086044"/>
+            <a:off x="3236403" y="860994"/>
             <a:ext cx="1745941" cy="369332"/>
           </a:xfrm>
           <a:prstGeom prst="rect">
@@ -3193,7 +3194,7 @@
         </p:nvSpPr>
         <p:spPr>
           <a:xfrm>
-            <a:off x="442403" y="2878985"/>
+            <a:off x="442403" y="2653935"/>
             <a:ext cx="1250350" cy="369332"/>
           </a:xfrm>
           <a:prstGeom prst="rect">
@@ -3223,7 +3224,7 @@
         </p:nvSpPr>
         <p:spPr>
           <a:xfrm>
-            <a:off x="6605177" y="1086044"/>
+            <a:off x="7280411" y="860994"/>
             <a:ext cx="664590" cy="369332"/>
           </a:xfrm>
           <a:prstGeom prst="rect">
@@ -3257,7 +3258,7 @@
         </p:nvSpPr>
         <p:spPr>
           <a:xfrm>
-            <a:off x="546991" y="1660355"/>
+            <a:off x="546991" y="1435305"/>
             <a:ext cx="948284" cy="369332"/>
           </a:xfrm>
           <a:prstGeom prst="rect">
@@ -3287,7 +3288,7 @@
         </p:nvSpPr>
         <p:spPr>
           <a:xfrm>
-            <a:off x="278050" y="1459573"/>
+            <a:off x="278050" y="1234523"/>
             <a:ext cx="2271059" cy="1284941"/>
           </a:xfrm>
           <a:prstGeom prst="rect">
@@ -3336,8 +3337,8 @@
         </p:nvSpPr>
         <p:spPr>
           <a:xfrm>
-            <a:off x="278050" y="3296676"/>
-            <a:ext cx="2271059" cy="2583335"/>
+            <a:off x="278050" y="3071626"/>
+            <a:ext cx="2271059" cy="3486977"/>
           </a:xfrm>
           <a:prstGeom prst="rect">
             <a:avLst/>
@@ -3385,8 +3386,8 @@
         </p:nvSpPr>
         <p:spPr>
           <a:xfrm>
-            <a:off x="2776214" y="1472415"/>
-            <a:ext cx="2910542" cy="4589041"/>
+            <a:off x="2776214" y="1247365"/>
+            <a:ext cx="3686886" cy="5311238"/>
           </a:xfrm>
           <a:prstGeom prst="rect">
             <a:avLst/>
@@ -3434,8 +3435,8 @@
         </p:nvSpPr>
         <p:spPr>
           <a:xfrm>
-            <a:off x="5854096" y="1459573"/>
-            <a:ext cx="2910542" cy="4589041"/>
+            <a:off x="6605176" y="1234523"/>
+            <a:ext cx="2159461" cy="5324080"/>
           </a:xfrm>
           <a:prstGeom prst="rect">
             <a:avLst/>
@@ -3483,7 +3484,7 @@
         </p:nvSpPr>
         <p:spPr>
           <a:xfrm>
-            <a:off x="442403" y="1833104"/>
+            <a:off x="442403" y="1608054"/>
             <a:ext cx="2589532" cy="1045881"/>
           </a:xfrm>
           <a:prstGeom prst="rightArrow">
@@ -3532,7 +3533,7 @@
         </p:nvSpPr>
         <p:spPr>
           <a:xfrm>
-            <a:off x="2892756" y="1812755"/>
+            <a:off x="2892756" y="1587705"/>
             <a:ext cx="778591" cy="307777"/>
           </a:xfrm>
           <a:prstGeom prst="rect">
@@ -3562,7 +3563,7 @@
         </p:nvSpPr>
         <p:spPr>
           <a:xfrm>
-            <a:off x="3077412" y="2258920"/>
+            <a:off x="3077412" y="2033870"/>
             <a:ext cx="2577286" cy="307777"/>
           </a:xfrm>
           <a:prstGeom prst="rect">
@@ -3592,7 +3593,7 @@
         </p:nvSpPr>
         <p:spPr>
           <a:xfrm>
-            <a:off x="3077412" y="2486776"/>
+            <a:off x="3077412" y="2261726"/>
             <a:ext cx="1064289" cy="307777"/>
           </a:xfrm>
           <a:prstGeom prst="rect">
@@ -3622,7 +3623,7 @@
         </p:nvSpPr>
         <p:spPr>
           <a:xfrm>
-            <a:off x="3077412" y="2714632"/>
+            <a:off x="3077412" y="2489582"/>
             <a:ext cx="1379091" cy="307777"/>
           </a:xfrm>
           <a:prstGeom prst="rect">
@@ -3652,7 +3653,7 @@
         </p:nvSpPr>
         <p:spPr>
           <a:xfrm>
-            <a:off x="3077412" y="2942488"/>
+            <a:off x="3077412" y="2717438"/>
             <a:ext cx="2230661" cy="307777"/>
           </a:xfrm>
           <a:prstGeom prst="rect">
@@ -3682,7 +3683,7 @@
         </p:nvSpPr>
         <p:spPr>
           <a:xfrm>
-            <a:off x="3077412" y="3170344"/>
+            <a:off x="3077412" y="2945294"/>
             <a:ext cx="1164840" cy="307777"/>
           </a:xfrm>
           <a:prstGeom prst="rect">
@@ -3712,7 +3713,7 @@
         </p:nvSpPr>
         <p:spPr>
           <a:xfrm>
-            <a:off x="502168" y="4826502"/>
+            <a:off x="502168" y="4601452"/>
             <a:ext cx="2589532" cy="1045881"/>
           </a:xfrm>
           <a:prstGeom prst="rightArrow">
@@ -3761,7 +3762,7 @@
         </p:nvSpPr>
         <p:spPr>
           <a:xfrm flipH="1">
-            <a:off x="452638" y="3480343"/>
+            <a:off x="452638" y="3255293"/>
             <a:ext cx="2589532" cy="1045881"/>
           </a:xfrm>
           <a:prstGeom prst="rightArrow">
@@ -3810,7 +3811,7 @@
         </p:nvSpPr>
         <p:spPr>
           <a:xfrm>
-            <a:off x="296908" y="4552762"/>
+            <a:off x="296908" y="4327712"/>
             <a:ext cx="2264587" cy="307777"/>
           </a:xfrm>
           <a:prstGeom prst="rect">
@@ -3858,10 +3859,1154 @@
           </a:p>
         </p:txBody>
       </p:sp>
+      <p:sp>
+        <p:nvSpPr>
+          <p:cNvPr id="23" name="TextBox 22"/>
+          <p:cNvSpPr txBox="1"/>
+          <p:nvPr/>
+        </p:nvSpPr>
+        <p:spPr>
+          <a:xfrm>
+            <a:off x="3303071" y="5019270"/>
+            <a:ext cx="3360168" cy="1600438"/>
+          </a:xfrm>
+          <a:prstGeom prst="rect">
+            <a:avLst/>
+          </a:prstGeom>
+          <a:noFill/>
+        </p:spPr>
+        <p:txBody>
+          <a:bodyPr wrap="square" rtlCol="0">
+            <a:spAutoFit/>
+          </a:bodyPr>
+          <a:lstStyle/>
+          <a:p>
+            <a:r>
+              <a:rPr lang="en-US" sz="1400" dirty="0" smtClean="0"/>
+              <a:t>Run&lt;&gt;/</a:t>
+            </a:r>
+          </a:p>
+          <a:p>
+            <a:r>
+              <a:rPr lang="en-US" sz="1400" dirty="0"/>
+              <a:t>	</a:t>
+            </a:r>
+            <a:r>
+              <a:rPr lang="en-US" sz="1400" dirty="0" smtClean="0"/>
+              <a:t>Data/</a:t>
+            </a:r>
+          </a:p>
+          <a:p>
+            <a:pPr lvl="2"/>
+            <a:r>
+              <a:rPr lang="en-US" sz="1400" dirty="0" err="1" smtClean="0"/>
+              <a:t>Basespace</a:t>
+            </a:r>
+            <a:r>
+              <a:rPr lang="en-US" sz="1400" dirty="0"/>
+              <a:t>/</a:t>
+            </a:r>
+            <a:endParaRPr lang="en-US" sz="1400" dirty="0" smtClean="0"/>
+          </a:p>
+          <a:p>
+            <a:pPr lvl="2"/>
+            <a:r>
+              <a:rPr lang="en-US" sz="1400" dirty="0" err="1" smtClean="0"/>
+              <a:t>Clntab</a:t>
+            </a:r>
+            <a:r>
+              <a:rPr lang="en-US" sz="1400" dirty="0" smtClean="0"/>
+              <a:t>/</a:t>
+            </a:r>
+          </a:p>
+          <a:p>
+            <a:pPr lvl="2"/>
+            <a:r>
+              <a:rPr lang="en-US" sz="1400" dirty="0"/>
+              <a:t>	</a:t>
+            </a:r>
+            <a:r>
+              <a:rPr lang="en-US" sz="1400" b="1" dirty="0" smtClean="0">
+                <a:solidFill>
+                  <a:srgbClr val="FF0000"/>
+                </a:solidFill>
+              </a:rPr>
+              <a:t>&lt;filename1&gt;.</a:t>
+            </a:r>
+            <a:r>
+              <a:rPr lang="en-US" sz="1400" b="1" dirty="0" err="1" smtClean="0">
+                <a:solidFill>
+                  <a:srgbClr val="FF0000"/>
+                </a:solidFill>
+              </a:rPr>
+              <a:t>clntab</a:t>
+            </a:r>
+            <a:endParaRPr lang="en-US" sz="1400" b="1" dirty="0" smtClean="0">
+              <a:solidFill>
+                <a:srgbClr val="FF0000"/>
+              </a:solidFill>
+            </a:endParaRPr>
+          </a:p>
+          <a:p>
+            <a:pPr lvl="2"/>
+            <a:r>
+              <a:rPr lang="en-US" sz="1400" b="1" dirty="0">
+                <a:solidFill>
+                  <a:srgbClr val="FF0000"/>
+                </a:solidFill>
+              </a:rPr>
+              <a:t>	</a:t>
+            </a:r>
+            <a:r>
+              <a:rPr lang="en-US" sz="1400" b="1" dirty="0" smtClean="0">
+                <a:solidFill>
+                  <a:srgbClr val="FF0000"/>
+                </a:solidFill>
+              </a:rPr>
+              <a:t>&lt;filename2&gt;.</a:t>
+            </a:r>
+            <a:r>
+              <a:rPr lang="en-US" sz="1400" b="1" dirty="0" err="1" smtClean="0">
+                <a:solidFill>
+                  <a:srgbClr val="FF0000"/>
+                </a:solidFill>
+              </a:rPr>
+              <a:t>clntab</a:t>
+            </a:r>
+            <a:endParaRPr lang="en-US" sz="1400" b="1" dirty="0" smtClean="0">
+              <a:solidFill>
+                <a:srgbClr val="FF0000"/>
+              </a:solidFill>
+            </a:endParaRPr>
+          </a:p>
+          <a:p>
+            <a:pPr lvl="2"/>
+            <a:r>
+              <a:rPr lang="en-US" sz="1400" b="1" dirty="0">
+                <a:solidFill>
+                  <a:srgbClr val="FF0000"/>
+                </a:solidFill>
+              </a:rPr>
+              <a:t>	</a:t>
+            </a:r>
+            <a:r>
+              <a:rPr lang="en-US" sz="1400" b="1" dirty="0" smtClean="0">
+                <a:solidFill>
+                  <a:srgbClr val="FF0000"/>
+                </a:solidFill>
+              </a:rPr>
+              <a:t>...</a:t>
+            </a:r>
+            <a:endParaRPr lang="en-US" sz="1400" b="1" dirty="0">
+              <a:solidFill>
+                <a:srgbClr val="FF0000"/>
+              </a:solidFill>
+            </a:endParaRPr>
+          </a:p>
+        </p:txBody>
+      </p:sp>
     </p:spTree>
     <p:extLst>
       <p:ext uri="{BB962C8B-B14F-4D97-AF65-F5344CB8AC3E}">
         <p14:creationId xmlns:p14="http://schemas.microsoft.com/office/powerpoint/2010/main" val="4228208889"/>
+      </p:ext>
+    </p:extLst>
+  </p:cSld>
+  <p:clrMapOvr>
+    <a:masterClrMapping/>
+  </p:clrMapOvr>
+</p:sld>
+</file>
+
+<file path=ppt/slides/slide2.xml><?xml version="1.0" encoding="utf-8"?>
+<p:sld xmlns:a="http://schemas.openxmlformats.org/drawingml/2006/main" xmlns:r="http://schemas.openxmlformats.org/officeDocument/2006/relationships" xmlns:p="http://schemas.openxmlformats.org/presentationml/2006/main">
+  <p:cSld>
+    <p:spTree>
+      <p:nvGrpSpPr>
+        <p:cNvPr id="1" name=""/>
+        <p:cNvGrpSpPr/>
+        <p:nvPr/>
+      </p:nvGrpSpPr>
+      <p:grpSpPr>
+        <a:xfrm>
+          <a:off x="0" y="0"/>
+          <a:ext cx="0" cy="0"/>
+          <a:chOff x="0" y="0"/>
+          <a:chExt cx="0" cy="0"/>
+        </a:xfrm>
+      </p:grpSpPr>
+      <p:sp>
+        <p:nvSpPr>
+          <p:cNvPr id="23" name="Down Arrow 22"/>
+          <p:cNvSpPr/>
+          <p:nvPr/>
+        </p:nvSpPr>
+        <p:spPr>
+          <a:xfrm>
+            <a:off x="1544473" y="3860709"/>
+            <a:ext cx="489618" cy="646331"/>
+          </a:xfrm>
+          <a:prstGeom prst="downArrow">
+            <a:avLst>
+              <a:gd name="adj1" fmla="val 50000"/>
+              <a:gd name="adj2" fmla="val 27520"/>
+            </a:avLst>
+          </a:prstGeom>
+        </p:spPr>
+        <p:style>
+          <a:lnRef idx="1">
+            <a:schemeClr val="accent1"/>
+          </a:lnRef>
+          <a:fillRef idx="3">
+            <a:schemeClr val="accent1"/>
+          </a:fillRef>
+          <a:effectRef idx="2">
+            <a:schemeClr val="accent1"/>
+          </a:effectRef>
+          <a:fontRef idx="minor">
+            <a:schemeClr val="lt1"/>
+          </a:fontRef>
+        </p:style>
+        <p:txBody>
+          <a:bodyPr rtlCol="0" anchor="ctr"/>
+          <a:lstStyle/>
+          <a:p>
+            <a:pPr algn="ctr"/>
+            <a:endParaRPr lang="en-US" sz="1200"/>
+          </a:p>
+        </p:txBody>
+      </p:sp>
+      <p:sp>
+        <p:nvSpPr>
+          <p:cNvPr id="24" name="Down Arrow 23"/>
+          <p:cNvSpPr/>
+          <p:nvPr/>
+        </p:nvSpPr>
+        <p:spPr>
+          <a:xfrm>
+            <a:off x="1633629" y="2317748"/>
+            <a:ext cx="489618" cy="445908"/>
+          </a:xfrm>
+          <a:prstGeom prst="downArrow">
+            <a:avLst>
+              <a:gd name="adj1" fmla="val 50000"/>
+              <a:gd name="adj2" fmla="val 27520"/>
+            </a:avLst>
+          </a:prstGeom>
+        </p:spPr>
+        <p:style>
+          <a:lnRef idx="1">
+            <a:schemeClr val="accent1"/>
+          </a:lnRef>
+          <a:fillRef idx="3">
+            <a:schemeClr val="accent1"/>
+          </a:fillRef>
+          <a:effectRef idx="2">
+            <a:schemeClr val="accent1"/>
+          </a:effectRef>
+          <a:fontRef idx="minor">
+            <a:schemeClr val="lt1"/>
+          </a:fontRef>
+        </p:style>
+        <p:txBody>
+          <a:bodyPr rtlCol="0" anchor="ctr"/>
+          <a:lstStyle/>
+          <a:p>
+            <a:pPr algn="ctr"/>
+            <a:endParaRPr lang="en-US" sz="1200"/>
+          </a:p>
+        </p:txBody>
+      </p:sp>
+      <p:sp>
+        <p:nvSpPr>
+          <p:cNvPr id="25" name="TextBox 24"/>
+          <p:cNvSpPr txBox="1"/>
+          <p:nvPr/>
+        </p:nvSpPr>
+        <p:spPr>
+          <a:xfrm>
+            <a:off x="585342" y="1950797"/>
+            <a:ext cx="1801921" cy="276999"/>
+          </a:xfrm>
+          <a:prstGeom prst="rect">
+            <a:avLst/>
+          </a:prstGeom>
+          <a:solidFill>
+            <a:schemeClr val="accent3">
+              <a:lumMod val="40000"/>
+              <a:lumOff val="60000"/>
+            </a:schemeClr>
+          </a:solidFill>
+        </p:spPr>
+        <p:txBody>
+          <a:bodyPr wrap="none" rtlCol="0">
+            <a:spAutoFit/>
+          </a:bodyPr>
+          <a:lstStyle/>
+          <a:p>
+            <a:r>
+              <a:rPr lang="en-US" sz="1200" dirty="0" err="1" smtClean="0"/>
+              <a:t>Clntab_vAndJ_filtered.rds</a:t>
+            </a:r>
+            <a:endParaRPr lang="en-US" sz="1200" dirty="0"/>
+          </a:p>
+        </p:txBody>
+      </p:sp>
+      <p:sp>
+        <p:nvSpPr>
+          <p:cNvPr id="26" name="TextBox 25"/>
+          <p:cNvSpPr txBox="1"/>
+          <p:nvPr/>
+        </p:nvSpPr>
+        <p:spPr>
+          <a:xfrm>
+            <a:off x="870545" y="2334342"/>
+            <a:ext cx="633507" cy="276999"/>
+          </a:xfrm>
+          <a:prstGeom prst="rect">
+            <a:avLst/>
+          </a:prstGeom>
+          <a:solidFill>
+            <a:schemeClr val="bg1"/>
+          </a:solidFill>
+          <a:ln>
+            <a:solidFill>
+              <a:schemeClr val="tx1">
+                <a:lumMod val="50000"/>
+                <a:lumOff val="50000"/>
+              </a:schemeClr>
+            </a:solidFill>
+          </a:ln>
+        </p:spPr>
+        <p:txBody>
+          <a:bodyPr wrap="none" rtlCol="0">
+            <a:spAutoFit/>
+          </a:bodyPr>
+          <a:lstStyle/>
+          <a:p>
+            <a:r>
+              <a:rPr lang="en-US" sz="1200" dirty="0" err="1" smtClean="0"/>
+              <a:t>Filter.R</a:t>
+            </a:r>
+            <a:endParaRPr lang="en-US" sz="1200" dirty="0"/>
+          </a:p>
+        </p:txBody>
+      </p:sp>
+      <p:sp>
+        <p:nvSpPr>
+          <p:cNvPr id="27" name="TextBox 26"/>
+          <p:cNvSpPr txBox="1"/>
+          <p:nvPr/>
+        </p:nvSpPr>
+        <p:spPr>
+          <a:xfrm>
+            <a:off x="496341" y="2812943"/>
+            <a:ext cx="1801921" cy="276999"/>
+          </a:xfrm>
+          <a:prstGeom prst="rect">
+            <a:avLst/>
+          </a:prstGeom>
+          <a:solidFill>
+            <a:srgbClr val="D7E4BD"/>
+          </a:solidFill>
+        </p:spPr>
+        <p:txBody>
+          <a:bodyPr wrap="none" rtlCol="0">
+            <a:spAutoFit/>
+          </a:bodyPr>
+          <a:lstStyle/>
+          <a:p>
+            <a:r>
+              <a:rPr lang="en-US" sz="1200" dirty="0" err="1" smtClean="0"/>
+              <a:t>Clntab_vAndJ_filtered.rds</a:t>
+            </a:r>
+            <a:endParaRPr lang="en-US" sz="1200" dirty="0"/>
+          </a:p>
+        </p:txBody>
+      </p:sp>
+      <p:sp>
+        <p:nvSpPr>
+          <p:cNvPr id="28" name="TextBox 27"/>
+          <p:cNvSpPr txBox="1"/>
+          <p:nvPr/>
+        </p:nvSpPr>
+        <p:spPr>
+          <a:xfrm>
+            <a:off x="2267940" y="3860709"/>
+            <a:ext cx="1005403" cy="646331"/>
+          </a:xfrm>
+          <a:prstGeom prst="rect">
+            <a:avLst/>
+          </a:prstGeom>
+          <a:solidFill>
+            <a:srgbClr val="FFFFFF"/>
+          </a:solidFill>
+          <a:ln>
+            <a:solidFill>
+              <a:srgbClr val="7F7F7F"/>
+            </a:solidFill>
+          </a:ln>
+        </p:spPr>
+        <p:txBody>
+          <a:bodyPr wrap="none" rtlCol="0">
+            <a:spAutoFit/>
+          </a:bodyPr>
+          <a:lstStyle/>
+          <a:p>
+            <a:r>
+              <a:rPr lang="en-US" sz="1200" dirty="0" err="1" smtClean="0"/>
+              <a:t>diversity.R</a:t>
+            </a:r>
+            <a:endParaRPr lang="en-US" sz="1200" dirty="0" smtClean="0"/>
+          </a:p>
+          <a:p>
+            <a:r>
+              <a:rPr lang="en-US" sz="1200" dirty="0" err="1"/>
+              <a:t>l</a:t>
+            </a:r>
+            <a:r>
+              <a:rPr lang="en-US" sz="1200" dirty="0" err="1" smtClean="0"/>
+              <a:t>ocus.R</a:t>
+            </a:r>
+            <a:endParaRPr lang="en-US" sz="1200" dirty="0" smtClean="0"/>
+          </a:p>
+          <a:p>
+            <a:r>
+              <a:rPr lang="en-US" sz="1200" dirty="0" err="1" smtClean="0"/>
+              <a:t>geneUsage.R</a:t>
+            </a:r>
+            <a:endParaRPr lang="en-US" sz="1200" dirty="0"/>
+          </a:p>
+        </p:txBody>
+      </p:sp>
+      <p:sp>
+        <p:nvSpPr>
+          <p:cNvPr id="29" name="Rectangle 28"/>
+          <p:cNvSpPr/>
+          <p:nvPr/>
+        </p:nvSpPr>
+        <p:spPr>
+          <a:xfrm>
+            <a:off x="493059" y="353650"/>
+            <a:ext cx="8236949" cy="6409765"/>
+          </a:xfrm>
+          <a:prstGeom prst="rect">
+            <a:avLst/>
+          </a:prstGeom>
+          <a:noFill/>
+        </p:spPr>
+        <p:style>
+          <a:lnRef idx="1">
+            <a:schemeClr val="accent1"/>
+          </a:lnRef>
+          <a:fillRef idx="3">
+            <a:schemeClr val="accent1"/>
+          </a:fillRef>
+          <a:effectRef idx="2">
+            <a:schemeClr val="accent1"/>
+          </a:effectRef>
+          <a:fontRef idx="minor">
+            <a:schemeClr val="lt1"/>
+          </a:fontRef>
+        </p:style>
+        <p:txBody>
+          <a:bodyPr rtlCol="0" anchor="ctr"/>
+          <a:lstStyle/>
+          <a:p>
+            <a:pPr algn="ctr"/>
+            <a:endParaRPr lang="en-US" sz="1200" b="1"/>
+          </a:p>
+        </p:txBody>
+      </p:sp>
+      <p:sp>
+        <p:nvSpPr>
+          <p:cNvPr id="30" name="TextBox 29"/>
+          <p:cNvSpPr txBox="1"/>
+          <p:nvPr/>
+        </p:nvSpPr>
+        <p:spPr>
+          <a:xfrm>
+            <a:off x="1086124" y="5417154"/>
+            <a:ext cx="1800493" cy="461665"/>
+          </a:xfrm>
+          <a:prstGeom prst="rect">
+            <a:avLst/>
+          </a:prstGeom>
+          <a:solidFill>
+            <a:srgbClr val="D7E4BD"/>
+          </a:solidFill>
+        </p:spPr>
+        <p:txBody>
+          <a:bodyPr wrap="none" rtlCol="0">
+            <a:spAutoFit/>
+          </a:bodyPr>
+          <a:lstStyle/>
+          <a:p>
+            <a:r>
+              <a:rPr lang="en-US" sz="1200" dirty="0"/>
+              <a:t>Results/</a:t>
+            </a:r>
+            <a:r>
+              <a:rPr lang="en-US" sz="1200" dirty="0" err="1" smtClean="0"/>
+              <a:t>LocusStats</a:t>
+            </a:r>
+            <a:r>
+              <a:rPr lang="en-US" sz="1200" dirty="0" smtClean="0"/>
+              <a:t>/</a:t>
+            </a:r>
+          </a:p>
+          <a:p>
+            <a:pPr marL="171450" indent="-171450">
+              <a:buFont typeface="Arial"/>
+              <a:buChar char="•"/>
+            </a:pPr>
+            <a:r>
+              <a:rPr lang="en-US" sz="1200" dirty="0" err="1" smtClean="0"/>
+              <a:t>locusSummary.xlsx</a:t>
+            </a:r>
+            <a:r>
+              <a:rPr lang="en-US" sz="1200" dirty="0" smtClean="0"/>
+              <a:t>/</a:t>
+            </a:r>
+            <a:r>
+              <a:rPr lang="en-US" sz="1200" dirty="0" err="1" smtClean="0"/>
+              <a:t>rds</a:t>
+            </a:r>
+            <a:endParaRPr lang="en-US" sz="1200" dirty="0"/>
+          </a:p>
+        </p:txBody>
+      </p:sp>
+      <p:sp>
+        <p:nvSpPr>
+          <p:cNvPr id="31" name="TextBox 30"/>
+          <p:cNvSpPr txBox="1"/>
+          <p:nvPr/>
+        </p:nvSpPr>
+        <p:spPr>
+          <a:xfrm>
+            <a:off x="1072079" y="4662613"/>
+            <a:ext cx="2407721" cy="646331"/>
+          </a:xfrm>
+          <a:prstGeom prst="rect">
+            <a:avLst/>
+          </a:prstGeom>
+          <a:solidFill>
+            <a:srgbClr val="D7E4BD"/>
+          </a:solidFill>
+        </p:spPr>
+        <p:txBody>
+          <a:bodyPr wrap="square" rtlCol="0">
+            <a:spAutoFit/>
+          </a:bodyPr>
+          <a:lstStyle/>
+          <a:p>
+            <a:r>
+              <a:rPr lang="en-US" sz="1200" dirty="0"/>
+              <a:t>Results/Diversity</a:t>
+            </a:r>
+            <a:r>
+              <a:rPr lang="en-US" sz="1200" dirty="0" smtClean="0"/>
+              <a:t>/</a:t>
+            </a:r>
+          </a:p>
+          <a:p>
+            <a:pPr marL="171450" indent="-171450">
+              <a:buFont typeface="Arial"/>
+              <a:buChar char="•"/>
+            </a:pPr>
+            <a:r>
+              <a:rPr lang="en-US" sz="1200" dirty="0" err="1" smtClean="0"/>
+              <a:t>diversityLocusAsCol.xlsx</a:t>
+            </a:r>
+            <a:r>
+              <a:rPr lang="en-US" sz="1200" dirty="0" smtClean="0"/>
+              <a:t>/</a:t>
+            </a:r>
+            <a:r>
+              <a:rPr lang="en-US" sz="1200" dirty="0" err="1" smtClean="0"/>
+              <a:t>rds</a:t>
+            </a:r>
+            <a:endParaRPr lang="en-US" sz="1200" dirty="0" smtClean="0"/>
+          </a:p>
+          <a:p>
+            <a:pPr marL="171450" indent="-171450">
+              <a:buFont typeface="Arial"/>
+              <a:buChar char="•"/>
+            </a:pPr>
+            <a:r>
+              <a:rPr lang="en-US" sz="1200" dirty="0" err="1" smtClean="0"/>
+              <a:t>diversity_withMean.rds</a:t>
+            </a:r>
+            <a:endParaRPr lang="en-US" sz="1200" dirty="0"/>
+          </a:p>
+        </p:txBody>
+      </p:sp>
+      <p:sp>
+        <p:nvSpPr>
+          <p:cNvPr id="32" name="TextBox 31"/>
+          <p:cNvSpPr txBox="1"/>
+          <p:nvPr/>
+        </p:nvSpPr>
+        <p:spPr>
+          <a:xfrm>
+            <a:off x="2399980" y="5421138"/>
+            <a:ext cx="1762021" cy="276999"/>
+          </a:xfrm>
+          <a:prstGeom prst="rect">
+            <a:avLst/>
+          </a:prstGeom>
+          <a:noFill/>
+        </p:spPr>
+        <p:txBody>
+          <a:bodyPr wrap="none" rtlCol="0">
+            <a:spAutoFit/>
+          </a:bodyPr>
+          <a:lstStyle/>
+          <a:p>
+            <a:r>
+              <a:rPr lang="en-US" sz="1200" dirty="0" smtClean="0"/>
+              <a:t>Phase out </a:t>
+            </a:r>
+            <a:r>
+              <a:rPr lang="en-US" sz="1200" dirty="0" err="1" smtClean="0"/>
+              <a:t>locusSummary</a:t>
+            </a:r>
+            <a:endParaRPr lang="en-US" sz="1200" dirty="0"/>
+          </a:p>
+        </p:txBody>
+      </p:sp>
+      <p:sp>
+        <p:nvSpPr>
+          <p:cNvPr id="33" name="TextBox 32"/>
+          <p:cNvSpPr txBox="1"/>
+          <p:nvPr/>
+        </p:nvSpPr>
+        <p:spPr>
+          <a:xfrm>
+            <a:off x="2467648" y="2812943"/>
+            <a:ext cx="2967479" cy="646331"/>
+          </a:xfrm>
+          <a:prstGeom prst="rect">
+            <a:avLst/>
+          </a:prstGeom>
+          <a:solidFill>
+            <a:schemeClr val="accent3">
+              <a:lumMod val="40000"/>
+              <a:lumOff val="60000"/>
+            </a:schemeClr>
+          </a:solidFill>
+        </p:spPr>
+        <p:txBody>
+          <a:bodyPr wrap="none" rtlCol="0">
+            <a:spAutoFit/>
+          </a:bodyPr>
+          <a:lstStyle/>
+          <a:p>
+            <a:r>
+              <a:rPr lang="en-US" sz="1200" dirty="0"/>
+              <a:t>Results/</a:t>
+            </a:r>
+            <a:r>
+              <a:rPr lang="en-US" sz="1200" dirty="0" err="1" smtClean="0"/>
+              <a:t>ReadCounts</a:t>
+            </a:r>
+            <a:r>
+              <a:rPr lang="en-US" sz="1200" dirty="0" smtClean="0"/>
+              <a:t>/</a:t>
+            </a:r>
+          </a:p>
+          <a:p>
+            <a:pPr marL="171450" indent="-171450">
+              <a:buFont typeface="Arial"/>
+              <a:buChar char="•"/>
+            </a:pPr>
+            <a:r>
+              <a:rPr lang="en-US" sz="1200" dirty="0" err="1" smtClean="0"/>
+              <a:t>readCountSummary_repsAsRows.xlsx</a:t>
+            </a:r>
+            <a:r>
+              <a:rPr lang="en-US" sz="1200" dirty="0" smtClean="0"/>
+              <a:t>/</a:t>
+            </a:r>
+            <a:r>
+              <a:rPr lang="en-US" sz="1200" dirty="0" err="1" smtClean="0"/>
+              <a:t>rds</a:t>
+            </a:r>
+            <a:endParaRPr lang="en-US" sz="1200" dirty="0" smtClean="0"/>
+          </a:p>
+          <a:p>
+            <a:pPr marL="171450" indent="-171450">
+              <a:buFont typeface="Arial"/>
+              <a:buChar char="•"/>
+            </a:pPr>
+            <a:r>
+              <a:rPr lang="en-US" sz="1200" dirty="0" err="1" smtClean="0"/>
+              <a:t>readCountSummary_repsAsCols.xlsx</a:t>
+            </a:r>
+            <a:endParaRPr lang="en-US" sz="1200" dirty="0"/>
+          </a:p>
+        </p:txBody>
+      </p:sp>
+      <p:sp>
+        <p:nvSpPr>
+          <p:cNvPr id="34" name="TextBox 33"/>
+          <p:cNvSpPr txBox="1"/>
+          <p:nvPr/>
+        </p:nvSpPr>
+        <p:spPr>
+          <a:xfrm>
+            <a:off x="2467648" y="3459274"/>
+            <a:ext cx="3095719" cy="276999"/>
+          </a:xfrm>
+          <a:prstGeom prst="rect">
+            <a:avLst/>
+          </a:prstGeom>
+          <a:solidFill>
+            <a:schemeClr val="accent3">
+              <a:lumMod val="40000"/>
+              <a:lumOff val="60000"/>
+            </a:schemeClr>
+          </a:solidFill>
+        </p:spPr>
+        <p:txBody>
+          <a:bodyPr wrap="none" rtlCol="0">
+            <a:spAutoFit/>
+          </a:bodyPr>
+          <a:lstStyle/>
+          <a:p>
+            <a:r>
+              <a:rPr lang="en-US" sz="1200" dirty="0" smtClean="0"/>
+              <a:t>Results/Templates/</a:t>
+            </a:r>
+            <a:r>
+              <a:rPr lang="en-US" sz="1200" dirty="0" err="1" smtClean="0"/>
+              <a:t>templateSummary.xlsx</a:t>
+            </a:r>
+            <a:r>
+              <a:rPr lang="en-US" sz="1200" dirty="0" smtClean="0"/>
+              <a:t>/</a:t>
+            </a:r>
+            <a:r>
+              <a:rPr lang="en-US" sz="1200" dirty="0" err="1" smtClean="0"/>
+              <a:t>rds</a:t>
+            </a:r>
+            <a:endParaRPr lang="en-US" sz="1200" dirty="0"/>
+          </a:p>
+        </p:txBody>
+      </p:sp>
+      <p:sp>
+        <p:nvSpPr>
+          <p:cNvPr id="35" name="TextBox 34"/>
+          <p:cNvSpPr txBox="1"/>
+          <p:nvPr/>
+        </p:nvSpPr>
+        <p:spPr>
+          <a:xfrm>
+            <a:off x="239301" y="4696035"/>
+            <a:ext cx="851515" cy="276999"/>
+          </a:xfrm>
+          <a:prstGeom prst="rect">
+            <a:avLst/>
+          </a:prstGeom>
+          <a:solidFill>
+            <a:srgbClr val="FFFFFF"/>
+          </a:solidFill>
+          <a:ln>
+            <a:solidFill>
+              <a:srgbClr val="7F7F7F"/>
+            </a:solidFill>
+          </a:ln>
+        </p:spPr>
+        <p:txBody>
+          <a:bodyPr wrap="none" rtlCol="0">
+            <a:spAutoFit/>
+          </a:bodyPr>
+          <a:lstStyle/>
+          <a:p>
+            <a:r>
+              <a:rPr lang="en-US" sz="1200" dirty="0" err="1" smtClean="0"/>
+              <a:t>diversity.R</a:t>
+            </a:r>
+            <a:endParaRPr lang="en-US" sz="1200" dirty="0" smtClean="0"/>
+          </a:p>
+        </p:txBody>
+      </p:sp>
+      <p:sp>
+        <p:nvSpPr>
+          <p:cNvPr id="36" name="TextBox 35"/>
+          <p:cNvSpPr txBox="1"/>
+          <p:nvPr/>
+        </p:nvSpPr>
+        <p:spPr>
+          <a:xfrm>
+            <a:off x="439935" y="5389804"/>
+            <a:ext cx="633507" cy="276999"/>
+          </a:xfrm>
+          <a:prstGeom prst="rect">
+            <a:avLst/>
+          </a:prstGeom>
+          <a:solidFill>
+            <a:srgbClr val="FFFFFF"/>
+          </a:solidFill>
+          <a:ln>
+            <a:solidFill>
+              <a:srgbClr val="7F7F7F"/>
+            </a:solidFill>
+          </a:ln>
+        </p:spPr>
+        <p:txBody>
+          <a:bodyPr wrap="none" rtlCol="0">
+            <a:spAutoFit/>
+          </a:bodyPr>
+          <a:lstStyle/>
+          <a:p>
+            <a:r>
+              <a:rPr lang="en-US" sz="1200" dirty="0" err="1" smtClean="0"/>
+              <a:t>locus.R</a:t>
+            </a:r>
+            <a:endParaRPr lang="en-US" sz="1200" dirty="0" smtClean="0"/>
+          </a:p>
+        </p:txBody>
+      </p:sp>
+      <p:sp>
+        <p:nvSpPr>
+          <p:cNvPr id="37" name="TextBox 36"/>
+          <p:cNvSpPr txBox="1"/>
+          <p:nvPr/>
+        </p:nvSpPr>
+        <p:spPr>
+          <a:xfrm>
+            <a:off x="1155700" y="6035700"/>
+            <a:ext cx="184666" cy="369332"/>
+          </a:xfrm>
+          <a:prstGeom prst="rect">
+            <a:avLst/>
+          </a:prstGeom>
+          <a:noFill/>
+        </p:spPr>
+        <p:txBody>
+          <a:bodyPr wrap="none" rtlCol="0">
+            <a:spAutoFit/>
+          </a:bodyPr>
+          <a:lstStyle/>
+          <a:p>
+            <a:endParaRPr lang="en-US" dirty="0"/>
+          </a:p>
+        </p:txBody>
+      </p:sp>
+      <p:sp>
+        <p:nvSpPr>
+          <p:cNvPr id="38" name="TextBox 37"/>
+          <p:cNvSpPr txBox="1"/>
+          <p:nvPr/>
+        </p:nvSpPr>
+        <p:spPr>
+          <a:xfrm>
+            <a:off x="1030120" y="6031219"/>
+            <a:ext cx="2377574" cy="646331"/>
+          </a:xfrm>
+          <a:prstGeom prst="rect">
+            <a:avLst/>
+          </a:prstGeom>
+          <a:solidFill>
+            <a:srgbClr val="D7E4BD"/>
+          </a:solidFill>
+        </p:spPr>
+        <p:txBody>
+          <a:bodyPr wrap="none" rtlCol="0">
+            <a:spAutoFit/>
+          </a:bodyPr>
+          <a:lstStyle/>
+          <a:p>
+            <a:r>
+              <a:rPr lang="en-US" sz="1200" dirty="0"/>
+              <a:t>Results</a:t>
+            </a:r>
+            <a:r>
+              <a:rPr lang="en-US" sz="1200" dirty="0" smtClean="0"/>
+              <a:t>/</a:t>
+            </a:r>
+            <a:r>
+              <a:rPr lang="en-US" sz="1200" dirty="0" err="1" smtClean="0"/>
+              <a:t>GeneUsage</a:t>
+            </a:r>
+            <a:r>
+              <a:rPr lang="en-US" sz="1200" dirty="0" smtClean="0"/>
+              <a:t>/</a:t>
+            </a:r>
+          </a:p>
+          <a:p>
+            <a:pPr marL="171450" indent="-171450">
+              <a:buFont typeface="Arial"/>
+              <a:buChar char="•"/>
+            </a:pPr>
+            <a:r>
+              <a:rPr lang="en-US" sz="1200" dirty="0" err="1" smtClean="0"/>
+              <a:t>geneUsageSummary_vGene.xlsx</a:t>
+            </a:r>
+            <a:endParaRPr lang="en-US" sz="1200" dirty="0" smtClean="0"/>
+          </a:p>
+          <a:p>
+            <a:pPr marL="171450" indent="-171450">
+              <a:buFont typeface="Arial"/>
+              <a:buChar char="•"/>
+            </a:pPr>
+            <a:r>
+              <a:rPr lang="en-US" sz="1200" dirty="0" err="1"/>
+              <a:t>geneUsageSummary_jGene.xlsx</a:t>
+            </a:r>
+            <a:endParaRPr lang="en-US" sz="1200" dirty="0"/>
+          </a:p>
+        </p:txBody>
+      </p:sp>
+      <p:sp>
+        <p:nvSpPr>
+          <p:cNvPr id="39" name="TextBox 38"/>
+          <p:cNvSpPr txBox="1"/>
+          <p:nvPr/>
+        </p:nvSpPr>
+        <p:spPr>
+          <a:xfrm>
+            <a:off x="11697" y="5979670"/>
+            <a:ext cx="1005403" cy="276999"/>
+          </a:xfrm>
+          <a:prstGeom prst="rect">
+            <a:avLst/>
+          </a:prstGeom>
+          <a:solidFill>
+            <a:srgbClr val="FFFFFF"/>
+          </a:solidFill>
+          <a:ln>
+            <a:solidFill>
+              <a:srgbClr val="7F7F7F"/>
+            </a:solidFill>
+          </a:ln>
+        </p:spPr>
+        <p:txBody>
+          <a:bodyPr wrap="none" rtlCol="0">
+            <a:spAutoFit/>
+          </a:bodyPr>
+          <a:lstStyle/>
+          <a:p>
+            <a:r>
+              <a:rPr lang="en-US" sz="1200" dirty="0" err="1" smtClean="0"/>
+              <a:t>geneUsage.R</a:t>
+            </a:r>
+            <a:endParaRPr lang="en-US" sz="1200" dirty="0"/>
+          </a:p>
+        </p:txBody>
+      </p:sp>
+      <p:sp>
+        <p:nvSpPr>
+          <p:cNvPr id="19" name="Down Arrow 18"/>
+          <p:cNvSpPr/>
+          <p:nvPr/>
+        </p:nvSpPr>
+        <p:spPr>
+          <a:xfrm>
+            <a:off x="1617171" y="1435672"/>
+            <a:ext cx="489618" cy="445908"/>
+          </a:xfrm>
+          <a:prstGeom prst="downArrow">
+            <a:avLst>
+              <a:gd name="adj1" fmla="val 50000"/>
+              <a:gd name="adj2" fmla="val 27520"/>
+            </a:avLst>
+          </a:prstGeom>
+        </p:spPr>
+        <p:style>
+          <a:lnRef idx="1">
+            <a:schemeClr val="accent1"/>
+          </a:lnRef>
+          <a:fillRef idx="3">
+            <a:schemeClr val="accent1"/>
+          </a:fillRef>
+          <a:effectRef idx="2">
+            <a:schemeClr val="accent1"/>
+          </a:effectRef>
+          <a:fontRef idx="minor">
+            <a:schemeClr val="lt1"/>
+          </a:fontRef>
+        </p:style>
+        <p:txBody>
+          <a:bodyPr rtlCol="0" anchor="ctr"/>
+          <a:lstStyle/>
+          <a:p>
+            <a:pPr algn="ctr"/>
+            <a:endParaRPr lang="en-US" sz="1200"/>
+          </a:p>
+        </p:txBody>
+      </p:sp>
+      <p:sp>
+        <p:nvSpPr>
+          <p:cNvPr id="20" name="TextBox 19"/>
+          <p:cNvSpPr txBox="1"/>
+          <p:nvPr/>
+        </p:nvSpPr>
+        <p:spPr>
+          <a:xfrm>
+            <a:off x="649269" y="666846"/>
+            <a:ext cx="1390375" cy="646331"/>
+          </a:xfrm>
+          <a:prstGeom prst="rect">
+            <a:avLst/>
+          </a:prstGeom>
+          <a:solidFill>
+            <a:schemeClr val="accent3">
+              <a:lumMod val="40000"/>
+              <a:lumOff val="60000"/>
+            </a:schemeClr>
+          </a:solidFill>
+        </p:spPr>
+        <p:txBody>
+          <a:bodyPr wrap="none" rtlCol="0">
+            <a:spAutoFit/>
+          </a:bodyPr>
+          <a:lstStyle/>
+          <a:p>
+            <a:r>
+              <a:rPr lang="en-US" sz="1200" dirty="0" smtClean="0"/>
+              <a:t>&lt;filename1&gt;.</a:t>
+            </a:r>
+            <a:r>
+              <a:rPr lang="en-US" sz="1200" dirty="0" err="1" smtClean="0"/>
+              <a:t>clntab</a:t>
+            </a:r>
+            <a:endParaRPr lang="en-US" sz="1200" dirty="0" smtClean="0"/>
+          </a:p>
+          <a:p>
+            <a:r>
+              <a:rPr lang="en-US" sz="1200" dirty="0"/>
+              <a:t>&lt;</a:t>
+            </a:r>
+            <a:r>
+              <a:rPr lang="en-US" sz="1200" dirty="0" smtClean="0"/>
+              <a:t>filename2&gt;</a:t>
+            </a:r>
+            <a:r>
+              <a:rPr lang="en-US" sz="1200" dirty="0"/>
+              <a:t>.</a:t>
+            </a:r>
+            <a:r>
+              <a:rPr lang="en-US" sz="1200" dirty="0" err="1"/>
+              <a:t>clntab</a:t>
+            </a:r>
+            <a:endParaRPr lang="en-US" sz="1200" dirty="0"/>
+          </a:p>
+          <a:p>
+            <a:r>
+              <a:rPr lang="en-US" sz="1200" dirty="0" smtClean="0"/>
+              <a:t>...</a:t>
+            </a:r>
+            <a:endParaRPr lang="en-US" sz="1200" dirty="0"/>
+          </a:p>
+        </p:txBody>
+      </p:sp>
+      <p:sp>
+        <p:nvSpPr>
+          <p:cNvPr id="21" name="TextBox 20"/>
+          <p:cNvSpPr txBox="1"/>
+          <p:nvPr/>
+        </p:nvSpPr>
+        <p:spPr>
+          <a:xfrm>
+            <a:off x="2387263" y="1435672"/>
+            <a:ext cx="1915909" cy="276999"/>
+          </a:xfrm>
+          <a:prstGeom prst="rect">
+            <a:avLst/>
+          </a:prstGeom>
+          <a:solidFill>
+            <a:schemeClr val="bg1"/>
+          </a:solidFill>
+          <a:ln>
+            <a:solidFill>
+              <a:schemeClr val="tx1">
+                <a:lumMod val="50000"/>
+                <a:lumOff val="50000"/>
+              </a:schemeClr>
+            </a:solidFill>
+          </a:ln>
+        </p:spPr>
+        <p:txBody>
+          <a:bodyPr wrap="none" rtlCol="0">
+            <a:spAutoFit/>
+          </a:bodyPr>
+          <a:lstStyle/>
+          <a:p>
+            <a:r>
+              <a:rPr lang="en-US" sz="1200" dirty="0" smtClean="0"/>
+              <a:t>7a_convertClntab2rdsFile.R</a:t>
+            </a:r>
+          </a:p>
+        </p:txBody>
+      </p:sp>
+      <p:sp>
+        <p:nvSpPr>
+          <p:cNvPr id="22" name="TextBox 21"/>
+          <p:cNvSpPr txBox="1"/>
+          <p:nvPr/>
+        </p:nvSpPr>
+        <p:spPr>
+          <a:xfrm>
+            <a:off x="2483018" y="1941912"/>
+            <a:ext cx="2262158" cy="461665"/>
+          </a:xfrm>
+          <a:prstGeom prst="rect">
+            <a:avLst/>
+          </a:prstGeom>
+          <a:solidFill>
+            <a:schemeClr val="accent3">
+              <a:lumMod val="40000"/>
+              <a:lumOff val="60000"/>
+            </a:schemeClr>
+          </a:solidFill>
+        </p:spPr>
+        <p:txBody>
+          <a:bodyPr wrap="none" rtlCol="0">
+            <a:spAutoFit/>
+          </a:bodyPr>
+          <a:lstStyle/>
+          <a:p>
+            <a:r>
+              <a:rPr lang="en-US" sz="1200" dirty="0"/>
+              <a:t>Results</a:t>
+            </a:r>
+            <a:r>
+              <a:rPr lang="en-US" sz="1200" dirty="0"/>
+              <a:t>/</a:t>
+            </a:r>
+            <a:r>
+              <a:rPr lang="en-US" sz="1200" dirty="0" err="1"/>
+              <a:t>ClntabJunctionCompare</a:t>
+            </a:r>
+            <a:r>
+              <a:rPr lang="en-US" sz="1200" dirty="0"/>
+              <a:t>/</a:t>
+            </a:r>
+            <a:endParaRPr lang="en-US" sz="1200" dirty="0" smtClean="0"/>
+          </a:p>
+          <a:p>
+            <a:pPr marL="171450" indent="-171450">
+              <a:buFont typeface="Arial"/>
+              <a:buChar char="•"/>
+            </a:pPr>
+            <a:r>
+              <a:rPr lang="en-US" sz="1200" dirty="0" smtClean="0"/>
+              <a:t>&lt;miscellaneous&gt;.</a:t>
+            </a:r>
+            <a:r>
+              <a:rPr lang="en-US" sz="1200" dirty="0" err="1" smtClean="0"/>
+              <a:t>pdf</a:t>
+            </a:r>
+            <a:endParaRPr lang="en-US" sz="1200" dirty="0" smtClean="0"/>
+          </a:p>
+        </p:txBody>
+      </p:sp>
+    </p:spTree>
+    <p:extLst>
+      <p:ext uri="{BB962C8B-B14F-4D97-AF65-F5344CB8AC3E}">
+        <p14:creationId xmlns:p14="http://schemas.microsoft.com/office/powerpoint/2010/main" val="731549115"/>
       </p:ext>
     </p:extLst>
   </p:cSld>

</xml_diff>